<commit_message>
Add powerpoint presentation with graphics explaining streams
</commit_message>
<xml_diff>
--- a/HelloJava/docs/Java 8 Streams.pptx
+++ b/HelloJava/docs/Java 8 Streams.pptx
@@ -12,6 +12,7 @@
     <p:sldId id="263" r:id="rId6"/>
     <p:sldId id="262" r:id="rId7"/>
     <p:sldId id="260" r:id="rId8"/>
+    <p:sldId id="264" r:id="rId9"/>
   </p:sldIdLst>
   <p:sldSz cx="12192000" cy="6858000"/>
   <p:notesSz cx="6858000" cy="9144000"/>
@@ -249,7 +250,7 @@
           <a:p>
             <a:fld id="{282FEEAD-475F-4498-814A-B331F0C14D3F}" type="datetimeFigureOut">
               <a:rPr lang="de-CH" smtClean="0"/>
-              <a:t>18.11.2016</a:t>
+              <a:t>22.11.2016</a:t>
             </a:fld>
             <a:endParaRPr lang="de-CH"/>
           </a:p>
@@ -419,7 +420,7 @@
           <a:p>
             <a:fld id="{282FEEAD-475F-4498-814A-B331F0C14D3F}" type="datetimeFigureOut">
               <a:rPr lang="de-CH" smtClean="0"/>
-              <a:t>18.11.2016</a:t>
+              <a:t>22.11.2016</a:t>
             </a:fld>
             <a:endParaRPr lang="de-CH"/>
           </a:p>
@@ -599,7 +600,7 @@
           <a:p>
             <a:fld id="{282FEEAD-475F-4498-814A-B331F0C14D3F}" type="datetimeFigureOut">
               <a:rPr lang="de-CH" smtClean="0"/>
-              <a:t>18.11.2016</a:t>
+              <a:t>22.11.2016</a:t>
             </a:fld>
             <a:endParaRPr lang="de-CH"/>
           </a:p>
@@ -769,7 +770,7 @@
           <a:p>
             <a:fld id="{282FEEAD-475F-4498-814A-B331F0C14D3F}" type="datetimeFigureOut">
               <a:rPr lang="de-CH" smtClean="0"/>
-              <a:t>18.11.2016</a:t>
+              <a:t>22.11.2016</a:t>
             </a:fld>
             <a:endParaRPr lang="de-CH"/>
           </a:p>
@@ -1015,7 +1016,7 @@
           <a:p>
             <a:fld id="{282FEEAD-475F-4498-814A-B331F0C14D3F}" type="datetimeFigureOut">
               <a:rPr lang="de-CH" smtClean="0"/>
-              <a:t>18.11.2016</a:t>
+              <a:t>22.11.2016</a:t>
             </a:fld>
             <a:endParaRPr lang="de-CH"/>
           </a:p>
@@ -1247,7 +1248,7 @@
           <a:p>
             <a:fld id="{282FEEAD-475F-4498-814A-B331F0C14D3F}" type="datetimeFigureOut">
               <a:rPr lang="de-CH" smtClean="0"/>
-              <a:t>18.11.2016</a:t>
+              <a:t>22.11.2016</a:t>
             </a:fld>
             <a:endParaRPr lang="de-CH"/>
           </a:p>
@@ -1614,7 +1615,7 @@
           <a:p>
             <a:fld id="{282FEEAD-475F-4498-814A-B331F0C14D3F}" type="datetimeFigureOut">
               <a:rPr lang="de-CH" smtClean="0"/>
-              <a:t>18.11.2016</a:t>
+              <a:t>22.11.2016</a:t>
             </a:fld>
             <a:endParaRPr lang="de-CH"/>
           </a:p>
@@ -1732,7 +1733,7 @@
           <a:p>
             <a:fld id="{282FEEAD-475F-4498-814A-B331F0C14D3F}" type="datetimeFigureOut">
               <a:rPr lang="de-CH" smtClean="0"/>
-              <a:t>18.11.2016</a:t>
+              <a:t>22.11.2016</a:t>
             </a:fld>
             <a:endParaRPr lang="de-CH"/>
           </a:p>
@@ -1827,7 +1828,7 @@
           <a:p>
             <a:fld id="{282FEEAD-475F-4498-814A-B331F0C14D3F}" type="datetimeFigureOut">
               <a:rPr lang="de-CH" smtClean="0"/>
-              <a:t>18.11.2016</a:t>
+              <a:t>22.11.2016</a:t>
             </a:fld>
             <a:endParaRPr lang="de-CH"/>
           </a:p>
@@ -2104,7 +2105,7 @@
           <a:p>
             <a:fld id="{282FEEAD-475F-4498-814A-B331F0C14D3F}" type="datetimeFigureOut">
               <a:rPr lang="de-CH" smtClean="0"/>
-              <a:t>18.11.2016</a:t>
+              <a:t>22.11.2016</a:t>
             </a:fld>
             <a:endParaRPr lang="de-CH"/>
           </a:p>
@@ -2357,7 +2358,7 @@
           <a:p>
             <a:fld id="{282FEEAD-475F-4498-814A-B331F0C14D3F}" type="datetimeFigureOut">
               <a:rPr lang="de-CH" smtClean="0"/>
-              <a:t>18.11.2016</a:t>
+              <a:t>22.11.2016</a:t>
             </a:fld>
             <a:endParaRPr lang="de-CH"/>
           </a:p>
@@ -2570,7 +2571,7 @@
           <a:p>
             <a:fld id="{282FEEAD-475F-4498-814A-B331F0C14D3F}" type="datetimeFigureOut">
               <a:rPr lang="de-CH" smtClean="0"/>
-              <a:t>18.11.2016</a:t>
+              <a:t>22.11.2016</a:t>
             </a:fld>
             <a:endParaRPr lang="de-CH"/>
           </a:p>
@@ -11123,6 +11124,80 @@
     <p:extLst>
       <p:ext uri="{BB962C8B-B14F-4D97-AF65-F5344CB8AC3E}">
         <p14:creationId xmlns:p14="http://schemas.microsoft.com/office/powerpoint/2010/main" val="1770422629"/>
+      </p:ext>
+    </p:extLst>
+  </p:cSld>
+  <p:clrMapOvr>
+    <a:masterClrMapping/>
+  </p:clrMapOvr>
+</p:sld>
+</file>
+
+<file path=ppt/slides/slide8.xml><?xml version="1.0" encoding="utf-8"?>
+<p:sld xmlns:a="http://schemas.openxmlformats.org/drawingml/2006/main" xmlns:r="http://schemas.openxmlformats.org/officeDocument/2006/relationships" xmlns:p="http://schemas.openxmlformats.org/presentationml/2006/main">
+  <p:cSld>
+    <p:spTree>
+      <p:nvGrpSpPr>
+        <p:cNvPr id="1" name=""/>
+        <p:cNvGrpSpPr/>
+        <p:nvPr/>
+      </p:nvGrpSpPr>
+      <p:grpSpPr>
+        <a:xfrm>
+          <a:off x="0" y="0"/>
+          <a:ext cx="0" cy="0"/>
+          <a:chOff x="0" y="0"/>
+          <a:chExt cx="0" cy="0"/>
+        </a:xfrm>
+      </p:grpSpPr>
+      <p:sp>
+        <p:nvSpPr>
+          <p:cNvPr id="2" name="Title 1"/>
+          <p:cNvSpPr>
+            <a:spLocks noGrp="1"/>
+          </p:cNvSpPr>
+          <p:nvPr>
+            <p:ph type="title"/>
+          </p:nvPr>
+        </p:nvSpPr>
+        <p:spPr/>
+        <p:txBody>
+          <a:bodyPr/>
+          <a:lstStyle/>
+          <a:p>
+            <a:r>
+              <a:rPr lang="de-CH" dirty="0"/>
+              <a:t>Resources</a:t>
+            </a:r>
+          </a:p>
+        </p:txBody>
+      </p:sp>
+      <p:sp>
+        <p:nvSpPr>
+          <p:cNvPr id="3" name="Content Placeholder 2"/>
+          <p:cNvSpPr>
+            <a:spLocks noGrp="1"/>
+          </p:cNvSpPr>
+          <p:nvPr>
+            <p:ph idx="1"/>
+          </p:nvPr>
+        </p:nvSpPr>
+        <p:spPr/>
+        <p:txBody>
+          <a:bodyPr/>
+          <a:lstStyle/>
+          <a:p>
+            <a:r>
+              <a:rPr lang="de-CH" dirty="0"/>
+              <a:t>https://github.com/eobermuhlner/java-snippets</a:t>
+            </a:r>
+          </a:p>
+        </p:txBody>
+      </p:sp>
+    </p:spTree>
+    <p:extLst>
+      <p:ext uri="{BB962C8B-B14F-4D97-AF65-F5344CB8AC3E}">
+        <p14:creationId xmlns:p14="http://schemas.microsoft.com/office/powerpoint/2010/main" val="2658761075"/>
       </p:ext>
     </p:extLst>
   </p:cSld>

</xml_diff>